<commit_message>
Made the talk Section 508 compliant.
</commit_message>
<xml_diff>
--- a/project_management/open_meetings/ICR_WS_Meeting_2011_05_11.pptx
+++ b/project_management/open_meetings/ICR_WS_Meeting_2011_05_11.pptx
@@ -1,6 +1,6 @@
 
 <file path=ppt/presentation.xml><?xml version="1.0" encoding="utf-8"?>
-<p:presentation xmlns:a="http://schemas.openxmlformats.org/drawingml/2006/main" xmlns:r="http://schemas.openxmlformats.org/officeDocument/2006/relationships" xmlns:mc="http://schemas.openxmlformats.org/markup-compatibility/2006" xmlns:mv="urn:schemas-microsoft-com:mac:vml" xmlns:p="http://schemas.openxmlformats.org/presentationml/2006/main" mc:Ignorable="mv" mc:PreserveAttributes="mv:*" showSpecialPlsOnTitleSld="0" saveSubsetFonts="1">
+<p:presentation xmlns:a="http://schemas.openxmlformats.org/drawingml/2006/main" xmlns:r="http://schemas.openxmlformats.org/officeDocument/2006/relationships" xmlns:p="http://schemas.openxmlformats.org/presentationml/2006/main" showSpecialPlsOnTitleSld="0" saveSubsetFonts="1">
   <p:sldMasterIdLst>
     <p:sldMasterId id="2147483648" r:id="rId1"/>
   </p:sldMasterIdLst>
@@ -152,7 +152,7 @@
 </file>
 
 <file path=ppt/handoutMasters/handoutMaster1.xml><?xml version="1.0" encoding="utf-8"?>
-<p:handoutMaster xmlns:a="http://schemas.openxmlformats.org/drawingml/2006/main" xmlns:r="http://schemas.openxmlformats.org/officeDocument/2006/relationships" xmlns:mc="http://schemas.openxmlformats.org/markup-compatibility/2006" xmlns:mv="urn:schemas-microsoft-com:mac:vml" xmlns:p="http://schemas.openxmlformats.org/presentationml/2006/main" mc:Ignorable="mv" mc:PreserveAttributes="mv:*">
+<p:handoutMaster xmlns:a="http://schemas.openxmlformats.org/drawingml/2006/main" xmlns:r="http://schemas.openxmlformats.org/officeDocument/2006/relationships" xmlns:p="http://schemas.openxmlformats.org/presentationml/2006/main">
   <p:cSld>
     <p:bg>
       <p:bgRef idx="1001">
@@ -234,7 +234,7 @@
             <a:fld id="{19C1E9F1-3EC1-6444-B428-4F8E6DCDED3B}" type="datetimeFigureOut">
               <a:rPr lang="en-US" smtClean="0"/>
               <a:pPr/>
-              <a:t>5/9/11</a:t>
+              <a:t>5/9/2011</a:t>
             </a:fld>
             <a:endParaRPr lang="en-US"/>
           </a:p>
@@ -315,7 +315,7 @@
 </file>
 
 <file path=ppt/notesMasters/notesMaster1.xml><?xml version="1.0" encoding="utf-8"?>
-<p:notesMaster xmlns:a="http://schemas.openxmlformats.org/drawingml/2006/main" xmlns:r="http://schemas.openxmlformats.org/officeDocument/2006/relationships" xmlns:mc="http://schemas.openxmlformats.org/markup-compatibility/2006" xmlns:mv="urn:schemas-microsoft-com:mac:vml" xmlns:p="http://schemas.openxmlformats.org/presentationml/2006/main" mc:Ignorable="mv" mc:PreserveAttributes="mv:*">
+<p:notesMaster xmlns:a="http://schemas.openxmlformats.org/drawingml/2006/main" xmlns:r="http://schemas.openxmlformats.org/officeDocument/2006/relationships" xmlns:p="http://schemas.openxmlformats.org/presentationml/2006/main">
   <p:cSld>
     <p:bg>
       <p:bgPr>
@@ -767,7 +767,7 @@
 </file>
 
 <file path=ppt/notesSlides/notesSlide1.xml><?xml version="1.0" encoding="utf-8"?>
-<p:notes xmlns:a="http://schemas.openxmlformats.org/drawingml/2006/main" xmlns:r="http://schemas.openxmlformats.org/officeDocument/2006/relationships" xmlns:mc="http://schemas.openxmlformats.org/markup-compatibility/2006" xmlns:mv="urn:schemas-microsoft-com:mac:vml" xmlns:p="http://schemas.openxmlformats.org/presentationml/2006/main" mc:Ignorable="mv" mc:PreserveAttributes="mv:*">
+<p:notes xmlns:a="http://schemas.openxmlformats.org/drawingml/2006/main" xmlns:r="http://schemas.openxmlformats.org/officeDocument/2006/relationships" xmlns:p="http://schemas.openxmlformats.org/presentationml/2006/main">
   <p:cSld>
     <p:spTree>
       <p:nvGrpSpPr>
@@ -869,7 +869,7 @@
 </file>
 
 <file path=ppt/notesSlides/notesSlide2.xml><?xml version="1.0" encoding="utf-8"?>
-<p:notes xmlns:a="http://schemas.openxmlformats.org/drawingml/2006/main" xmlns:r="http://schemas.openxmlformats.org/officeDocument/2006/relationships" xmlns:mc="http://schemas.openxmlformats.org/markup-compatibility/2006" xmlns:mv="urn:schemas-microsoft-com:mac:vml" xmlns:p="http://schemas.openxmlformats.org/presentationml/2006/main" mc:Ignorable="mv" mc:PreserveAttributes="mv:*">
+<p:notes xmlns:a="http://schemas.openxmlformats.org/drawingml/2006/main" xmlns:r="http://schemas.openxmlformats.org/officeDocument/2006/relationships" xmlns:p="http://schemas.openxmlformats.org/presentationml/2006/main">
   <p:cSld>
     <p:spTree>
       <p:nvGrpSpPr>
@@ -932,7 +932,7 @@
 </file>
 
 <file path=ppt/notesSlides/notesSlide3.xml><?xml version="1.0" encoding="utf-8"?>
-<p:notes xmlns:a="http://schemas.openxmlformats.org/drawingml/2006/main" xmlns:r="http://schemas.openxmlformats.org/officeDocument/2006/relationships" xmlns:mc="http://schemas.openxmlformats.org/markup-compatibility/2006" xmlns:mv="urn:schemas-microsoft-com:mac:vml" xmlns:p="http://schemas.openxmlformats.org/presentationml/2006/main" mc:Ignorable="mv" mc:PreserveAttributes="mv:*">
+<p:notes xmlns:a="http://schemas.openxmlformats.org/drawingml/2006/main" xmlns:r="http://schemas.openxmlformats.org/officeDocument/2006/relationships" xmlns:p="http://schemas.openxmlformats.org/presentationml/2006/main">
   <p:cSld>
     <p:spTree>
       <p:nvGrpSpPr>
@@ -995,7 +995,7 @@
 </file>
 
 <file path=ppt/notesSlides/notesSlide4.xml><?xml version="1.0" encoding="utf-8"?>
-<p:notes xmlns:a="http://schemas.openxmlformats.org/drawingml/2006/main" xmlns:r="http://schemas.openxmlformats.org/officeDocument/2006/relationships" xmlns:mc="http://schemas.openxmlformats.org/markup-compatibility/2006" xmlns:mv="urn:schemas-microsoft-com:mac:vml" xmlns:p="http://schemas.openxmlformats.org/presentationml/2006/main" mc:Ignorable="mv" mc:PreserveAttributes="mv:*">
+<p:notes xmlns:a="http://schemas.openxmlformats.org/drawingml/2006/main" xmlns:r="http://schemas.openxmlformats.org/officeDocument/2006/relationships" xmlns:p="http://schemas.openxmlformats.org/presentationml/2006/main">
   <p:cSld>
     <p:spTree>
       <p:nvGrpSpPr>
@@ -1058,7 +1058,7 @@
 </file>
 
 <file path=ppt/notesSlides/notesSlide5.xml><?xml version="1.0" encoding="utf-8"?>
-<p:notes xmlns:a="http://schemas.openxmlformats.org/drawingml/2006/main" xmlns:r="http://schemas.openxmlformats.org/officeDocument/2006/relationships" xmlns:mc="http://schemas.openxmlformats.org/markup-compatibility/2006" xmlns:mv="urn:schemas-microsoft-com:mac:vml" xmlns:p="http://schemas.openxmlformats.org/presentationml/2006/main" mc:Ignorable="mv" mc:PreserveAttributes="mv:*">
+<p:notes xmlns:a="http://schemas.openxmlformats.org/drawingml/2006/main" xmlns:r="http://schemas.openxmlformats.org/officeDocument/2006/relationships" xmlns:p="http://schemas.openxmlformats.org/presentationml/2006/main">
   <p:cSld>
     <p:spTree>
       <p:nvGrpSpPr>
@@ -1121,7 +1121,7 @@
 </file>
 
 <file path=ppt/notesSlides/notesSlide6.xml><?xml version="1.0" encoding="utf-8"?>
-<p:notes xmlns:a="http://schemas.openxmlformats.org/drawingml/2006/main" xmlns:r="http://schemas.openxmlformats.org/officeDocument/2006/relationships" xmlns:mc="http://schemas.openxmlformats.org/markup-compatibility/2006" xmlns:mv="urn:schemas-microsoft-com:mac:vml" xmlns:p="http://schemas.openxmlformats.org/presentationml/2006/main" mc:Ignorable="mv" mc:PreserveAttributes="mv:*">
+<p:notes xmlns:a="http://schemas.openxmlformats.org/drawingml/2006/main" xmlns:r="http://schemas.openxmlformats.org/officeDocument/2006/relationships" xmlns:p="http://schemas.openxmlformats.org/presentationml/2006/main">
   <p:cSld>
     <p:spTree>
       <p:nvGrpSpPr>
@@ -1184,7 +1184,7 @@
 </file>
 
 <file path=ppt/notesSlides/notesSlide7.xml><?xml version="1.0" encoding="utf-8"?>
-<p:notes xmlns:a="http://schemas.openxmlformats.org/drawingml/2006/main" xmlns:r="http://schemas.openxmlformats.org/officeDocument/2006/relationships" xmlns:mc="http://schemas.openxmlformats.org/markup-compatibility/2006" xmlns:mv="urn:schemas-microsoft-com:mac:vml" xmlns:p="http://schemas.openxmlformats.org/presentationml/2006/main" mc:Ignorable="mv" mc:PreserveAttributes="mv:*">
+<p:notes xmlns:a="http://schemas.openxmlformats.org/drawingml/2006/main" xmlns:r="http://schemas.openxmlformats.org/officeDocument/2006/relationships" xmlns:p="http://schemas.openxmlformats.org/presentationml/2006/main">
   <p:cSld>
     <p:spTree>
       <p:nvGrpSpPr>
@@ -1247,7 +1247,7 @@
 </file>
 
 <file path=ppt/notesSlides/notesSlide8.xml><?xml version="1.0" encoding="utf-8"?>
-<p:notes xmlns:a="http://schemas.openxmlformats.org/drawingml/2006/main" xmlns:r="http://schemas.openxmlformats.org/officeDocument/2006/relationships" xmlns:mc="http://schemas.openxmlformats.org/markup-compatibility/2006" xmlns:mv="urn:schemas-microsoft-com:mac:vml" xmlns:p="http://schemas.openxmlformats.org/presentationml/2006/main" mc:Ignorable="mv" mc:PreserveAttributes="mv:*">
+<p:notes xmlns:a="http://schemas.openxmlformats.org/drawingml/2006/main" xmlns:r="http://schemas.openxmlformats.org/officeDocument/2006/relationships" xmlns:p="http://schemas.openxmlformats.org/presentationml/2006/main">
   <p:cSld>
     <p:spTree>
       <p:nvGrpSpPr>
@@ -1310,7 +1310,7 @@
 </file>
 
 <file path=ppt/slideLayouts/slideLayout1.xml><?xml version="1.0" encoding="utf-8"?>
-<p:sldLayout xmlns:a="http://schemas.openxmlformats.org/drawingml/2006/main" xmlns:r="http://schemas.openxmlformats.org/officeDocument/2006/relationships" xmlns:mc="http://schemas.openxmlformats.org/markup-compatibility/2006" xmlns:mv="urn:schemas-microsoft-com:mac:vml" xmlns:p="http://schemas.openxmlformats.org/presentationml/2006/main" mc:Ignorable="mv" mc:PreserveAttributes="mv:*" showMasterSp="0" type="title" preserve="1">
+<p:sldLayout xmlns:a="http://schemas.openxmlformats.org/drawingml/2006/main" xmlns:r="http://schemas.openxmlformats.org/officeDocument/2006/relationships" xmlns:p="http://schemas.openxmlformats.org/presentationml/2006/main" showMasterSp="0" type="title" preserve="1">
   <p:cSld name="Title Slide">
     <p:spTree>
       <p:nvGrpSpPr>
@@ -1335,7 +1335,7 @@
           <p:nvPr userDrawn="1"/>
         </p:nvPicPr>
         <p:blipFill>
-          <a:blip r:embed="rId2"/>
+          <a:blip r:embed="rId2" cstate="print"/>
           <a:srcRect/>
           <a:stretch>
             <a:fillRect/>
@@ -1367,7 +1367,7 @@
           <p:nvPr userDrawn="1"/>
         </p:nvPicPr>
         <p:blipFill>
-          <a:blip r:embed="rId3"/>
+          <a:blip r:embed="rId3" cstate="print"/>
           <a:srcRect r="85001"/>
           <a:stretch>
             <a:fillRect/>
@@ -1434,7 +1434,7 @@
 </file>
 
 <file path=ppt/slideLayouts/slideLayout10.xml><?xml version="1.0" encoding="utf-8"?>
-<p:sldLayout xmlns:a="http://schemas.openxmlformats.org/drawingml/2006/main" xmlns:r="http://schemas.openxmlformats.org/officeDocument/2006/relationships" xmlns:mc="http://schemas.openxmlformats.org/markup-compatibility/2006" xmlns:mv="urn:schemas-microsoft-com:mac:vml" xmlns:p="http://schemas.openxmlformats.org/presentationml/2006/main" mc:Ignorable="mv" mc:PreserveAttributes="mv:*" type="vertTx" preserve="1">
+<p:sldLayout xmlns:a="http://schemas.openxmlformats.org/drawingml/2006/main" xmlns:r="http://schemas.openxmlformats.org/officeDocument/2006/relationships" xmlns:p="http://schemas.openxmlformats.org/presentationml/2006/main" type="vertTx" preserve="1">
   <p:cSld name="Title and Vertical Text">
     <p:spTree>
       <p:nvGrpSpPr>
@@ -1534,7 +1534,7 @@
 </file>
 
 <file path=ppt/slideLayouts/slideLayout11.xml><?xml version="1.0" encoding="utf-8"?>
-<p:sldLayout xmlns:a="http://schemas.openxmlformats.org/drawingml/2006/main" xmlns:r="http://schemas.openxmlformats.org/officeDocument/2006/relationships" xmlns:mc="http://schemas.openxmlformats.org/markup-compatibility/2006" xmlns:mv="urn:schemas-microsoft-com:mac:vml" xmlns:p="http://schemas.openxmlformats.org/presentationml/2006/main" mc:Ignorable="mv" mc:PreserveAttributes="mv:*" type="vertTitleAndTx" preserve="1">
+<p:sldLayout xmlns:a="http://schemas.openxmlformats.org/drawingml/2006/main" xmlns:r="http://schemas.openxmlformats.org/officeDocument/2006/relationships" xmlns:p="http://schemas.openxmlformats.org/presentationml/2006/main" type="vertTitleAndTx" preserve="1">
   <p:cSld name="Vertical Title and Text">
     <p:spTree>
       <p:nvGrpSpPr>
@@ -1644,7 +1644,7 @@
 </file>
 
 <file path=ppt/slideLayouts/slideLayout2.xml><?xml version="1.0" encoding="utf-8"?>
-<p:sldLayout xmlns:a="http://schemas.openxmlformats.org/drawingml/2006/main" xmlns:r="http://schemas.openxmlformats.org/officeDocument/2006/relationships" xmlns:mc="http://schemas.openxmlformats.org/markup-compatibility/2006" xmlns:mv="urn:schemas-microsoft-com:mac:vml" xmlns:p="http://schemas.openxmlformats.org/presentationml/2006/main" mc:Ignorable="mv" mc:PreserveAttributes="mv:*" type="obj" preserve="1">
+<p:sldLayout xmlns:a="http://schemas.openxmlformats.org/drawingml/2006/main" xmlns:r="http://schemas.openxmlformats.org/officeDocument/2006/relationships" xmlns:p="http://schemas.openxmlformats.org/presentationml/2006/main" type="obj" preserve="1">
   <p:cSld name="Title and Content">
     <p:spTree>
       <p:nvGrpSpPr>
@@ -1744,7 +1744,7 @@
 </file>
 
 <file path=ppt/slideLayouts/slideLayout3.xml><?xml version="1.0" encoding="utf-8"?>
-<p:sldLayout xmlns:a="http://schemas.openxmlformats.org/drawingml/2006/main" xmlns:r="http://schemas.openxmlformats.org/officeDocument/2006/relationships" xmlns:mc="http://schemas.openxmlformats.org/markup-compatibility/2006" xmlns:mv="urn:schemas-microsoft-com:mac:vml" xmlns:p="http://schemas.openxmlformats.org/presentationml/2006/main" mc:Ignorable="mv" mc:PreserveAttributes="mv:*" type="secHead" preserve="1">
+<p:sldLayout xmlns:a="http://schemas.openxmlformats.org/drawingml/2006/main" xmlns:r="http://schemas.openxmlformats.org/officeDocument/2006/relationships" xmlns:p="http://schemas.openxmlformats.org/presentationml/2006/main" type="secHead" preserve="1">
   <p:cSld name="Section Header">
     <p:spTree>
       <p:nvGrpSpPr>
@@ -1866,7 +1866,7 @@
 </file>
 
 <file path=ppt/slideLayouts/slideLayout4.xml><?xml version="1.0" encoding="utf-8"?>
-<p:sldLayout xmlns:a="http://schemas.openxmlformats.org/drawingml/2006/main" xmlns:r="http://schemas.openxmlformats.org/officeDocument/2006/relationships" xmlns:mc="http://schemas.openxmlformats.org/markup-compatibility/2006" xmlns:mv="urn:schemas-microsoft-com:mac:vml" xmlns:p="http://schemas.openxmlformats.org/presentationml/2006/main" mc:Ignorable="mv" mc:PreserveAttributes="mv:*" type="twoObj" preserve="1">
+<p:sldLayout xmlns:a="http://schemas.openxmlformats.org/drawingml/2006/main" xmlns:r="http://schemas.openxmlformats.org/officeDocument/2006/relationships" xmlns:p="http://schemas.openxmlformats.org/presentationml/2006/main" type="twoObj" preserve="1">
   <p:cSld name="Two Content">
     <p:spTree>
       <p:nvGrpSpPr>
@@ -2084,7 +2084,7 @@
 </file>
 
 <file path=ppt/slideLayouts/slideLayout5.xml><?xml version="1.0" encoding="utf-8"?>
-<p:sldLayout xmlns:a="http://schemas.openxmlformats.org/drawingml/2006/main" xmlns:r="http://schemas.openxmlformats.org/officeDocument/2006/relationships" xmlns:mc="http://schemas.openxmlformats.org/markup-compatibility/2006" xmlns:mv="urn:schemas-microsoft-com:mac:vml" xmlns:p="http://schemas.openxmlformats.org/presentationml/2006/main" mc:Ignorable="mv" mc:PreserveAttributes="mv:*" type="twoTxTwoObj" preserve="1">
+<p:sldLayout xmlns:a="http://schemas.openxmlformats.org/drawingml/2006/main" xmlns:r="http://schemas.openxmlformats.org/officeDocument/2006/relationships" xmlns:p="http://schemas.openxmlformats.org/presentationml/2006/main" type="twoTxTwoObj" preserve="1">
   <p:cSld name="Comparison">
     <p:spTree>
       <p:nvGrpSpPr>
@@ -2441,7 +2441,7 @@
 </file>
 
 <file path=ppt/slideLayouts/slideLayout6.xml><?xml version="1.0" encoding="utf-8"?>
-<p:sldLayout xmlns:a="http://schemas.openxmlformats.org/drawingml/2006/main" xmlns:r="http://schemas.openxmlformats.org/officeDocument/2006/relationships" xmlns:mc="http://schemas.openxmlformats.org/markup-compatibility/2006" xmlns:mv="urn:schemas-microsoft-com:mac:vml" xmlns:p="http://schemas.openxmlformats.org/presentationml/2006/main" mc:Ignorable="mv" mc:PreserveAttributes="mv:*" type="titleOnly" preserve="1">
+<p:sldLayout xmlns:a="http://schemas.openxmlformats.org/drawingml/2006/main" xmlns:r="http://schemas.openxmlformats.org/officeDocument/2006/relationships" xmlns:p="http://schemas.openxmlformats.org/presentationml/2006/main" type="titleOnly" preserve="1">
   <p:cSld name="Title Only">
     <p:spTree>
       <p:nvGrpSpPr>
@@ -2489,7 +2489,7 @@
 </file>
 
 <file path=ppt/slideLayouts/slideLayout7.xml><?xml version="1.0" encoding="utf-8"?>
-<p:sldLayout xmlns:a="http://schemas.openxmlformats.org/drawingml/2006/main" xmlns:r="http://schemas.openxmlformats.org/officeDocument/2006/relationships" xmlns:mc="http://schemas.openxmlformats.org/markup-compatibility/2006" xmlns:mv="urn:schemas-microsoft-com:mac:vml" xmlns:p="http://schemas.openxmlformats.org/presentationml/2006/main" mc:Ignorable="mv" mc:PreserveAttributes="mv:*" type="blank" preserve="1">
+<p:sldLayout xmlns:a="http://schemas.openxmlformats.org/drawingml/2006/main" xmlns:r="http://schemas.openxmlformats.org/officeDocument/2006/relationships" xmlns:p="http://schemas.openxmlformats.org/presentationml/2006/main" type="blank" preserve="1">
   <p:cSld name="Blank">
     <p:spTree>
       <p:nvGrpSpPr>
@@ -2514,7 +2514,7 @@
 </file>
 
 <file path=ppt/slideLayouts/slideLayout8.xml><?xml version="1.0" encoding="utf-8"?>
-<p:sldLayout xmlns:a="http://schemas.openxmlformats.org/drawingml/2006/main" xmlns:r="http://schemas.openxmlformats.org/officeDocument/2006/relationships" xmlns:mc="http://schemas.openxmlformats.org/markup-compatibility/2006" xmlns:mv="urn:schemas-microsoft-com:mac:vml" xmlns:p="http://schemas.openxmlformats.org/presentationml/2006/main" mc:Ignorable="mv" mc:PreserveAttributes="mv:*" type="objTx" preserve="1">
+<p:sldLayout xmlns:a="http://schemas.openxmlformats.org/drawingml/2006/main" xmlns:r="http://schemas.openxmlformats.org/officeDocument/2006/relationships" xmlns:p="http://schemas.openxmlformats.org/presentationml/2006/main" type="objTx" preserve="1">
   <p:cSld name="Content with Caption">
     <p:spTree>
       <p:nvGrpSpPr>
@@ -2721,7 +2721,7 @@
 </file>
 
 <file path=ppt/slideLayouts/slideLayout9.xml><?xml version="1.0" encoding="utf-8"?>
-<p:sldLayout xmlns:a="http://schemas.openxmlformats.org/drawingml/2006/main" xmlns:r="http://schemas.openxmlformats.org/officeDocument/2006/relationships" xmlns:mc="http://schemas.openxmlformats.org/markup-compatibility/2006" xmlns:mv="urn:schemas-microsoft-com:mac:vml" xmlns:p="http://schemas.openxmlformats.org/presentationml/2006/main" mc:Ignorable="mv" mc:PreserveAttributes="mv:*" type="picTx" preserve="1">
+<p:sldLayout xmlns:a="http://schemas.openxmlformats.org/drawingml/2006/main" xmlns:r="http://schemas.openxmlformats.org/officeDocument/2006/relationships" xmlns:p="http://schemas.openxmlformats.org/presentationml/2006/main" type="picTx" preserve="1">
   <p:cSld name="Picture with Caption">
     <p:spTree>
       <p:nvGrpSpPr>
@@ -2905,7 +2905,7 @@
 </file>
 
 <file path=ppt/slideMasters/slideMaster1.xml><?xml version="1.0" encoding="utf-8"?>
-<p:sldMaster xmlns:a="http://schemas.openxmlformats.org/drawingml/2006/main" xmlns:r="http://schemas.openxmlformats.org/officeDocument/2006/relationships" xmlns:mc="http://schemas.openxmlformats.org/markup-compatibility/2006" xmlns:mv="urn:schemas-microsoft-com:mac:vml" xmlns:p="http://schemas.openxmlformats.org/presentationml/2006/main" mc:Ignorable="mv" mc:PreserveAttributes="mv:*">
+<p:sldMaster xmlns:a="http://schemas.openxmlformats.org/drawingml/2006/main" xmlns:r="http://schemas.openxmlformats.org/officeDocument/2006/relationships" xmlns:p="http://schemas.openxmlformats.org/presentationml/2006/main">
   <p:cSld>
     <p:bg>
       <p:bgPr>
@@ -2938,7 +2938,7 @@
           <p:nvPr userDrawn="1"/>
         </p:nvPicPr>
         <p:blipFill>
-          <a:blip r:embed="rId13"/>
+          <a:blip r:embed="rId13" cstate="print"/>
           <a:srcRect/>
           <a:stretch>
             <a:fillRect/>
@@ -3471,7 +3471,7 @@
 </file>
 
 <file path=ppt/slides/slide1.xml><?xml version="1.0" encoding="utf-8"?>
-<p:sld xmlns:a="http://schemas.openxmlformats.org/drawingml/2006/main" xmlns:r="http://schemas.openxmlformats.org/officeDocument/2006/relationships" xmlns:mc="http://schemas.openxmlformats.org/markup-compatibility/2006" xmlns:mv="urn:schemas-microsoft-com:mac:vml" xmlns:p="http://schemas.openxmlformats.org/presentationml/2006/main" mc:Ignorable="mv" mc:PreserveAttributes="mv:*">
+<p:sld xmlns:a="http://schemas.openxmlformats.org/drawingml/2006/main" xmlns:r="http://schemas.openxmlformats.org/officeDocument/2006/relationships" xmlns:p="http://schemas.openxmlformats.org/presentationml/2006/main">
   <p:cSld>
     <p:spTree>
       <p:nvGrpSpPr>
@@ -3582,7 +3582,7 @@
           <p:nvPr/>
         </p:nvPicPr>
         <p:blipFill>
-          <a:blip r:embed="rId3"/>
+          <a:blip r:embed="rId3" cstate="print"/>
           <a:srcRect/>
           <a:stretch>
             <a:fillRect/>
@@ -3614,7 +3614,7 @@
           <p:nvPr/>
         </p:nvPicPr>
         <p:blipFill>
-          <a:blip r:embed="rId4"/>
+          <a:blip r:embed="rId4" cstate="print"/>
           <a:srcRect r="85001"/>
           <a:stretch>
             <a:fillRect/>
@@ -3677,18 +3677,25 @@
               <a:rPr lang="en-US" dirty="0" smtClean="0">
                 <a:ea typeface="ＭＳ Ｐゴシック" charset="-128"/>
               </a:rPr>
-              <a:t>Manage Job Queue</a:t>
-            </a:r>
-            <a:br>
+              <a:t>Release</a:t>
+            </a:r>
+            <a:r>
               <a:rPr lang="en-US" dirty="0" smtClean="0">
                 <a:ea typeface="ＭＳ Ｐゴシック" charset="-128"/>
               </a:rPr>
-            </a:br>
+              <a:t> </a:t>
+            </a:r>
             <a:r>
               <a:rPr lang="en-US" dirty="0" smtClean="0">
                 <a:ea typeface="ＭＳ Ｐゴシック" charset="-128"/>
               </a:rPr>
-              <a:t>in 2.4.1</a:t>
+              <a:t>2.4.1</a:t>
+            </a:r>
+            <a:r>
+              <a:rPr lang="en-US" dirty="0" smtClean="0">
+                <a:ea typeface="ＭＳ Ｐゴシック" charset="-128"/>
+              </a:rPr>
+              <a:t/>
             </a:r>
             <a:br>
               <a:rPr lang="en-US" dirty="0" smtClean="0">
@@ -3847,7 +3854,7 @@
 </file>
 
 <file path=ppt/slides/slide2.xml><?xml version="1.0" encoding="utf-8"?>
-<p:sld xmlns:a="http://schemas.openxmlformats.org/drawingml/2006/main" xmlns:r="http://schemas.openxmlformats.org/officeDocument/2006/relationships" xmlns:mc="http://schemas.openxmlformats.org/markup-compatibility/2006" xmlns:mv="urn:schemas-microsoft-com:mac:vml" xmlns:p="http://schemas.openxmlformats.org/presentationml/2006/main" mc:Ignorable="mv" mc:PreserveAttributes="mv:*">
+<p:sld xmlns:a="http://schemas.openxmlformats.org/drawingml/2006/main" xmlns:r="http://schemas.openxmlformats.org/officeDocument/2006/relationships" xmlns:p="http://schemas.openxmlformats.org/presentationml/2006/main">
   <p:cSld>
     <p:spTree>
       <p:nvGrpSpPr>
@@ -4046,7 +4053,7 @@
 </file>
 
 <file path=ppt/slides/slide3.xml><?xml version="1.0" encoding="utf-8"?>
-<p:sld xmlns:a="http://schemas.openxmlformats.org/drawingml/2006/main" xmlns:r="http://schemas.openxmlformats.org/officeDocument/2006/relationships" xmlns:mc="http://schemas.openxmlformats.org/markup-compatibility/2006" xmlns:mv="urn:schemas-microsoft-com:mac:vml" xmlns:p="http://schemas.openxmlformats.org/presentationml/2006/main" mc:Ignorable="mv" mc:PreserveAttributes="mv:*">
+<p:sld xmlns:a="http://schemas.openxmlformats.org/drawingml/2006/main" xmlns:r="http://schemas.openxmlformats.org/officeDocument/2006/relationships" xmlns:p="http://schemas.openxmlformats.org/presentationml/2006/main">
   <p:cSld>
     <p:spTree>
       <p:nvGrpSpPr>
@@ -4122,7 +4129,7 @@
 </file>
 
 <file path=ppt/slides/slide4.xml><?xml version="1.0" encoding="utf-8"?>
-<p:sld xmlns:a="http://schemas.openxmlformats.org/drawingml/2006/main" xmlns:r="http://schemas.openxmlformats.org/officeDocument/2006/relationships" xmlns:mc="http://schemas.openxmlformats.org/markup-compatibility/2006" xmlns:mv="urn:schemas-microsoft-com:mac:vml" xmlns:p="http://schemas.openxmlformats.org/presentationml/2006/main" mc:Ignorable="mv" mc:PreserveAttributes="mv:*">
+<p:sld xmlns:a="http://schemas.openxmlformats.org/drawingml/2006/main" xmlns:r="http://schemas.openxmlformats.org/officeDocument/2006/relationships" xmlns:p="http://schemas.openxmlformats.org/presentationml/2006/main">
   <p:cSld>
     <p:spTree>
       <p:nvGrpSpPr>
@@ -4160,22 +4167,19 @@
               </a:rPr>
               <a:t>Screenshot: Job Queue</a:t>
             </a:r>
-            <a:endParaRPr lang="en-US" dirty="0" smtClean="0">
-              <a:ea typeface="ＭＳ Ｐゴシック" charset="-128"/>
-            </a:endParaRPr>
           </a:p>
         </p:txBody>
       </p:sp>
       <p:pic>
         <p:nvPicPr>
-          <p:cNvPr id="4" name="Picture 3" descr="job_queue.png"/>
+          <p:cNvPr id="4" name="Picture 3" descr="Screenshot of the Job Queue page showing list of jobs in the queue and the ability to cancel a job that has not started."/>
           <p:cNvPicPr>
             <a:picLocks noChangeAspect="1"/>
           </p:cNvPicPr>
           <p:nvPr/>
         </p:nvPicPr>
         <p:blipFill>
-          <a:blip r:embed="rId3"/>
+          <a:blip r:embed="rId3" cstate="print"/>
           <a:stretch>
             <a:fillRect/>
           </a:stretch>
@@ -4206,7 +4210,7 @@
 </file>
 
 <file path=ppt/slides/slide5.xml><?xml version="1.0" encoding="utf-8"?>
-<p:sld xmlns:a="http://schemas.openxmlformats.org/drawingml/2006/main" xmlns:r="http://schemas.openxmlformats.org/officeDocument/2006/relationships" xmlns:mc="http://schemas.openxmlformats.org/markup-compatibility/2006" xmlns:mv="urn:schemas-microsoft-com:mac:vml" xmlns:p="http://schemas.openxmlformats.org/presentationml/2006/main" mc:Ignorable="mv" mc:PreserveAttributes="mv:*">
+<p:sld xmlns:a="http://schemas.openxmlformats.org/drawingml/2006/main" xmlns:r="http://schemas.openxmlformats.org/officeDocument/2006/relationships" xmlns:p="http://schemas.openxmlformats.org/presentationml/2006/main">
   <p:cSld>
     <p:spTree>
       <p:nvGrpSpPr>
@@ -4244,22 +4248,19 @@
               </a:rPr>
               <a:t>Screenshot: Organisms from the NCBI Taxonomy</a:t>
             </a:r>
-            <a:endParaRPr lang="en-US" dirty="0" smtClean="0">
-              <a:ea typeface="ＭＳ Ｐゴシック" charset="-128"/>
-            </a:endParaRPr>
           </a:p>
         </p:txBody>
       </p:sp>
       <p:pic>
         <p:nvPicPr>
-          <p:cNvPr id="4" name="Picture 3" descr="organisms.png"/>
+          <p:cNvPr id="4" name="Picture 3" descr="Screenshot showing that the contents of the organism-selection drop-down box are limited to the NCBI Taxonomy."/>
           <p:cNvPicPr>
             <a:picLocks noChangeAspect="1"/>
           </p:cNvPicPr>
           <p:nvPr/>
         </p:nvPicPr>
         <p:blipFill>
-          <a:blip r:embed="rId3"/>
+          <a:blip r:embed="rId3" cstate="print"/>
           <a:stretch>
             <a:fillRect/>
           </a:stretch>
@@ -4290,7 +4291,7 @@
 </file>
 
 <file path=ppt/slides/slide6.xml><?xml version="1.0" encoding="utf-8"?>
-<p:sld xmlns:a="http://schemas.openxmlformats.org/drawingml/2006/main" xmlns:r="http://schemas.openxmlformats.org/officeDocument/2006/relationships" xmlns:mc="http://schemas.openxmlformats.org/markup-compatibility/2006" xmlns:mv="urn:schemas-microsoft-com:mac:vml" xmlns:p="http://schemas.openxmlformats.org/presentationml/2006/main" mc:Ignorable="mv" mc:PreserveAttributes="mv:*">
+<p:sld xmlns:a="http://schemas.openxmlformats.org/drawingml/2006/main" xmlns:r="http://schemas.openxmlformats.org/officeDocument/2006/relationships" xmlns:p="http://schemas.openxmlformats.org/presentationml/2006/main">
   <p:cSld>
     <p:spTree>
       <p:nvGrpSpPr>
@@ -4328,22 +4329,19 @@
               </a:rPr>
               <a:t>Screenshots: Search by Publication</a:t>
             </a:r>
-            <a:endParaRPr lang="en-US" dirty="0" smtClean="0">
-              <a:ea typeface="ＭＳ Ｐゴシック" charset="-128"/>
-            </a:endParaRPr>
           </a:p>
         </p:txBody>
       </p:sp>
       <p:pic>
         <p:nvPicPr>
-          <p:cNvPr id="4" name="Picture 3" descr="search_criteria.png"/>
+          <p:cNvPr id="4" name="Picture 3" descr="Screenshot of main caArray page showing the two new search criteria for experiments, which are PubMed ID and Publication Author."/>
           <p:cNvPicPr>
             <a:picLocks noChangeAspect="1"/>
           </p:cNvPicPr>
           <p:nvPr/>
         </p:nvPicPr>
         <p:blipFill>
-          <a:blip r:embed="rId3"/>
+          <a:blip r:embed="rId3" cstate="print"/>
           <a:stretch>
             <a:fillRect/>
           </a:stretch>
@@ -4374,7 +4372,7 @@
 </file>
 
 <file path=ppt/slides/slide7.xml><?xml version="1.0" encoding="utf-8"?>
-<p:sld xmlns:a="http://schemas.openxmlformats.org/drawingml/2006/main" xmlns:r="http://schemas.openxmlformats.org/officeDocument/2006/relationships" xmlns:mc="http://schemas.openxmlformats.org/markup-compatibility/2006" xmlns:mv="urn:schemas-microsoft-com:mac:vml" xmlns:p="http://schemas.openxmlformats.org/presentationml/2006/main" mc:Ignorable="mv" mc:PreserveAttributes="mv:*">
+<p:sld xmlns:a="http://schemas.openxmlformats.org/drawingml/2006/main" xmlns:r="http://schemas.openxmlformats.org/officeDocument/2006/relationships" xmlns:p="http://schemas.openxmlformats.org/presentationml/2006/main">
   <p:cSld>
     <p:spTree>
       <p:nvGrpSpPr>
@@ -4412,22 +4410,19 @@
               </a:rPr>
               <a:t>Screenshots: Search by Publication</a:t>
             </a:r>
-            <a:endParaRPr lang="en-US" dirty="0" smtClean="0">
-              <a:ea typeface="ＭＳ Ｐゴシック" charset="-128"/>
-            </a:endParaRPr>
           </a:p>
         </p:txBody>
       </p:sp>
       <p:pic>
         <p:nvPicPr>
-          <p:cNvPr id="5" name="Picture 4" descr="search_by_pubmed_id.png"/>
+          <p:cNvPr id="5" name="Picture 4" descr="Screenshot showing search by PubMed ID."/>
           <p:cNvPicPr>
             <a:picLocks noChangeAspect="1"/>
           </p:cNvPicPr>
           <p:nvPr/>
         </p:nvPicPr>
         <p:blipFill>
-          <a:blip r:embed="rId3"/>
+          <a:blip r:embed="rId3" cstate="print"/>
           <a:stretch>
             <a:fillRect/>
           </a:stretch>
@@ -4444,14 +4439,14 @@
       </p:pic>
       <p:pic>
         <p:nvPicPr>
-          <p:cNvPr id="6" name="Picture 5" descr="search_by_author.png"/>
+          <p:cNvPr id="6" name="Picture 5" descr="Screenshot showing Search by Author."/>
           <p:cNvPicPr>
             <a:picLocks noChangeAspect="1"/>
           </p:cNvPicPr>
           <p:nvPr/>
         </p:nvPicPr>
         <p:blipFill>
-          <a:blip r:embed="rId4"/>
+          <a:blip r:embed="rId4" cstate="print"/>
           <a:stretch>
             <a:fillRect/>
           </a:stretch>
@@ -4468,14 +4463,14 @@
       </p:pic>
       <p:pic>
         <p:nvPicPr>
-          <p:cNvPr id="7" name="Picture 6" descr="search_by_author_results.png"/>
+          <p:cNvPr id="7" name="Picture 6" descr="Screenshot showing results from Search by Author."/>
           <p:cNvPicPr>
             <a:picLocks noChangeAspect="1"/>
           </p:cNvPicPr>
           <p:nvPr/>
         </p:nvPicPr>
         <p:blipFill>
-          <a:blip r:embed="rId5"/>
+          <a:blip r:embed="rId5" cstate="print"/>
           <a:stretch>
             <a:fillRect/>
           </a:stretch>
@@ -4506,7 +4501,7 @@
 </file>
 
 <file path=ppt/slides/slide8.xml><?xml version="1.0" encoding="utf-8"?>
-<p:sld xmlns:a="http://schemas.openxmlformats.org/drawingml/2006/main" xmlns:r="http://schemas.openxmlformats.org/officeDocument/2006/relationships" xmlns:mc="http://schemas.openxmlformats.org/markup-compatibility/2006" xmlns:mv="urn:schemas-microsoft-com:mac:vml" xmlns:p="http://schemas.openxmlformats.org/presentationml/2006/main" mc:Ignorable="mv" mc:PreserveAttributes="mv:*">
+<p:sld xmlns:a="http://schemas.openxmlformats.org/drawingml/2006/main" xmlns:r="http://schemas.openxmlformats.org/officeDocument/2006/relationships" xmlns:p="http://schemas.openxmlformats.org/presentationml/2006/main">
   <p:cSld>
     <p:spTree>
       <p:nvGrpSpPr>
@@ -4571,8 +4566,16 @@
           <a:p>
             <a:pPr lvl="1" eaLnBrk="1" hangingPunct="1"/>
             <a:r>
+              <a:rPr lang="en-US" sz="1600" dirty="0" smtClean="0">
+                <a:solidFill>
+                  <a:srgbClr val="0070C0"/>
+                </a:solidFill>
+              </a:rPr>
+              <a:t>Easier upload and import of large data sets</a:t>
+            </a:r>
+            <a:r>
               <a:rPr lang="en-US" sz="1600" dirty="0" smtClean="0"/>
-              <a:t>Easier upload and import of large data sets without having to break them into batches. Files can be stored on the file system rather than in the database. An Upload/Download manager eliminates the 2GB upload limit and allows </a:t>
+              <a:t> without having to break them into batches. Files can be stored on the file system rather than in the database. An Upload/Download manager eliminates the 2GB upload limit and allows </a:t>
             </a:r>
             <a:r>
               <a:rPr lang="en-US" sz="1600" dirty="0" err="1" smtClean="0"/>
@@ -4586,15 +4589,39 @@
           <a:p>
             <a:pPr lvl="1" eaLnBrk="1" hangingPunct="1"/>
             <a:r>
+              <a:rPr lang="en-US" sz="1600" dirty="0" smtClean="0">
+                <a:solidFill>
+                  <a:srgbClr val="0070C0"/>
+                </a:solidFill>
+              </a:rPr>
+              <a:t>A plug-in architecture</a:t>
+            </a:r>
+            <a:r>
               <a:rPr lang="en-US" sz="1600" dirty="0" smtClean="0"/>
-              <a:t>A plug-in architecture that supports the easy addition of parsers for new data types without requiring a new application release. Plug-ins can be hot-deployed into a running caArray instance and are instantly picked up and incorporated into the application.</a:t>
+              <a:t> that supports the easy addition of parsers for new data types without requiring a new application release. Plug-ins can be hot-deployed into a running caArray instance and are instantly picked up and incorporated into the application.</a:t>
             </a:r>
           </a:p>
           <a:p>
             <a:pPr lvl="1" eaLnBrk="1" hangingPunct="1"/>
             <a:r>
+              <a:rPr lang="en-US" sz="1600" dirty="0" smtClean="0">
+                <a:solidFill>
+                  <a:srgbClr val="0070C0"/>
+                </a:solidFill>
+              </a:rPr>
+              <a:t>An updated technology </a:t>
+            </a:r>
+            <a:r>
+              <a:rPr lang="en-US" sz="1600" dirty="0" smtClean="0">
+                <a:solidFill>
+                  <a:srgbClr val="0070C0"/>
+                </a:solidFill>
+              </a:rPr>
+              <a:t>stack</a:t>
+            </a:r>
+            <a:r>
               <a:rPr lang="en-US" sz="1600" dirty="0" smtClean="0"/>
-              <a:t>Update the technology stack (</a:t>
+              <a:t> (</a:t>
             </a:r>
             <a:r>
               <a:rPr lang="en-US" sz="1600" dirty="0" err="1" smtClean="0"/>
@@ -4602,15 +4629,7 @@
             </a:r>
             <a:r>
               <a:rPr lang="en-US" sz="1600" dirty="0" smtClean="0"/>
-              <a:t> 5.1, </a:t>
-            </a:r>
-            <a:r>
-              <a:rPr lang="en-US" sz="1600" dirty="0" err="1" smtClean="0"/>
-              <a:t>MySQL</a:t>
-            </a:r>
-            <a:r>
-              <a:rPr lang="en-US" sz="1600" dirty="0" smtClean="0"/>
-              <a:t> 5.1, BDA 1.7, Java 6)</a:t>
+              <a:t> 5.1, MySQL 5.1, BDA 1.7, Java 6)</a:t>
             </a:r>
           </a:p>
         </p:txBody>
@@ -4631,7 +4650,7 @@
 </file>
 
 <file path=ppt/slides/slide9.xml><?xml version="1.0" encoding="utf-8"?>
-<p:sld xmlns:a="http://schemas.openxmlformats.org/drawingml/2006/main" xmlns:r="http://schemas.openxmlformats.org/officeDocument/2006/relationships" xmlns:mc="http://schemas.openxmlformats.org/markup-compatibility/2006" xmlns:mv="urn:schemas-microsoft-com:mac:vml" xmlns:p="http://schemas.openxmlformats.org/presentationml/2006/main" mc:Ignorable="mv" mc:PreserveAttributes="mv:*">
+<p:sld xmlns:a="http://schemas.openxmlformats.org/drawingml/2006/main" xmlns:r="http://schemas.openxmlformats.org/officeDocument/2006/relationships" xmlns:p="http://schemas.openxmlformats.org/presentationml/2006/main">
   <p:cSld>
     <p:spTree>
       <p:nvGrpSpPr>

</xml_diff>